<commit_message>
Francesco's push 04-01 14:20
</commit_message>
<xml_diff>
--- a/RESUME_FILE.pptx
+++ b/RESUME_FILE.pptx
@@ -261,7 +261,7 @@
           <a:p>
             <a:fld id="{EBAE6F0D-826F-41C4-985F-786251EE2949}" type="datetimeFigureOut">
               <a:rPr lang="it-IT" smtClean="0"/>
-              <a:t>03/01/2024</a:t>
+              <a:t>04/01/2024</a:t>
             </a:fld>
             <a:endParaRPr lang="it-IT"/>
           </a:p>
@@ -459,7 +459,7 @@
           <a:p>
             <a:fld id="{EBAE6F0D-826F-41C4-985F-786251EE2949}" type="datetimeFigureOut">
               <a:rPr lang="it-IT" smtClean="0"/>
-              <a:t>03/01/2024</a:t>
+              <a:t>04/01/2024</a:t>
             </a:fld>
             <a:endParaRPr lang="it-IT"/>
           </a:p>
@@ -667,7 +667,7 @@
           <a:p>
             <a:fld id="{EBAE6F0D-826F-41C4-985F-786251EE2949}" type="datetimeFigureOut">
               <a:rPr lang="it-IT" smtClean="0"/>
-              <a:t>03/01/2024</a:t>
+              <a:t>04/01/2024</a:t>
             </a:fld>
             <a:endParaRPr lang="it-IT"/>
           </a:p>
@@ -865,7 +865,7 @@
           <a:p>
             <a:fld id="{EBAE6F0D-826F-41C4-985F-786251EE2949}" type="datetimeFigureOut">
               <a:rPr lang="it-IT" smtClean="0"/>
-              <a:t>03/01/2024</a:t>
+              <a:t>04/01/2024</a:t>
             </a:fld>
             <a:endParaRPr lang="it-IT"/>
           </a:p>
@@ -1140,7 +1140,7 @@
           <a:p>
             <a:fld id="{EBAE6F0D-826F-41C4-985F-786251EE2949}" type="datetimeFigureOut">
               <a:rPr lang="it-IT" smtClean="0"/>
-              <a:t>03/01/2024</a:t>
+              <a:t>04/01/2024</a:t>
             </a:fld>
             <a:endParaRPr lang="it-IT"/>
           </a:p>
@@ -1405,7 +1405,7 @@
           <a:p>
             <a:fld id="{EBAE6F0D-826F-41C4-985F-786251EE2949}" type="datetimeFigureOut">
               <a:rPr lang="it-IT" smtClean="0"/>
-              <a:t>03/01/2024</a:t>
+              <a:t>04/01/2024</a:t>
             </a:fld>
             <a:endParaRPr lang="it-IT"/>
           </a:p>
@@ -1817,7 +1817,7 @@
           <a:p>
             <a:fld id="{EBAE6F0D-826F-41C4-985F-786251EE2949}" type="datetimeFigureOut">
               <a:rPr lang="it-IT" smtClean="0"/>
-              <a:t>03/01/2024</a:t>
+              <a:t>04/01/2024</a:t>
             </a:fld>
             <a:endParaRPr lang="it-IT"/>
           </a:p>
@@ -1958,7 +1958,7 @@
           <a:p>
             <a:fld id="{EBAE6F0D-826F-41C4-985F-786251EE2949}" type="datetimeFigureOut">
               <a:rPr lang="it-IT" smtClean="0"/>
-              <a:t>03/01/2024</a:t>
+              <a:t>04/01/2024</a:t>
             </a:fld>
             <a:endParaRPr lang="it-IT"/>
           </a:p>
@@ -2071,7 +2071,7 @@
           <a:p>
             <a:fld id="{EBAE6F0D-826F-41C4-985F-786251EE2949}" type="datetimeFigureOut">
               <a:rPr lang="it-IT" smtClean="0"/>
-              <a:t>03/01/2024</a:t>
+              <a:t>04/01/2024</a:t>
             </a:fld>
             <a:endParaRPr lang="it-IT"/>
           </a:p>
@@ -2382,7 +2382,7 @@
           <a:p>
             <a:fld id="{EBAE6F0D-826F-41C4-985F-786251EE2949}" type="datetimeFigureOut">
               <a:rPr lang="it-IT" smtClean="0"/>
-              <a:t>03/01/2024</a:t>
+              <a:t>04/01/2024</a:t>
             </a:fld>
             <a:endParaRPr lang="it-IT"/>
           </a:p>
@@ -2670,7 +2670,7 @@
           <a:p>
             <a:fld id="{EBAE6F0D-826F-41C4-985F-786251EE2949}" type="datetimeFigureOut">
               <a:rPr lang="it-IT" smtClean="0"/>
-              <a:t>03/01/2024</a:t>
+              <a:t>04/01/2024</a:t>
             </a:fld>
             <a:endParaRPr lang="it-IT"/>
           </a:p>
@@ -2911,7 +2911,7 @@
           <a:p>
             <a:fld id="{EBAE6F0D-826F-41C4-985F-786251EE2949}" type="datetimeFigureOut">
               <a:rPr lang="it-IT" smtClean="0"/>
-              <a:t>03/01/2024</a:t>
+              <a:t>04/01/2024</a:t>
             </a:fld>
             <a:endParaRPr lang="it-IT"/>
           </a:p>
@@ -6139,7 +6139,7 @@
           <a:p>
             <a:r>
               <a:rPr lang="it-IT" b="1" dirty="0"/>
-              <a:t>Test in anello chiuso</a:t>
+              <a:t>Test  Simulink in anello chiuso</a:t>
             </a:r>
           </a:p>
         </p:txBody>

</xml_diff>